<commit_message>
local changes for testing
</commit_message>
<xml_diff>
--- a/Documents/PowerPoints/Senior Design Project - Gate 6 1.0.pptx
+++ b/Documents/PowerPoints/Senior Design Project - Gate 6 1.0.pptx
@@ -5,10 +5,10 @@
     <p:sldMasterId id="2147483663" r:id="rId1"/>
   </p:sldMasterIdLst>
   <p:notesMasterIdLst>
-    <p:notesMasterId r:id="rId17"/>
+    <p:notesMasterId r:id="rId18"/>
   </p:notesMasterIdLst>
   <p:handoutMasterIdLst>
-    <p:handoutMasterId r:id="rId18"/>
+    <p:handoutMasterId r:id="rId19"/>
   </p:handoutMasterIdLst>
   <p:sldIdLst>
     <p:sldId id="258" r:id="rId2"/>
@@ -20,12 +20,13 @@
     <p:sldId id="281" r:id="rId8"/>
     <p:sldId id="282" r:id="rId9"/>
     <p:sldId id="283" r:id="rId10"/>
-    <p:sldId id="275" r:id="rId11"/>
-    <p:sldId id="276" r:id="rId12"/>
-    <p:sldId id="267" r:id="rId13"/>
-    <p:sldId id="268" r:id="rId14"/>
-    <p:sldId id="269" r:id="rId15"/>
-    <p:sldId id="285" r:id="rId16"/>
+    <p:sldId id="286" r:id="rId11"/>
+    <p:sldId id="275" r:id="rId12"/>
+    <p:sldId id="276" r:id="rId13"/>
+    <p:sldId id="267" r:id="rId14"/>
+    <p:sldId id="268" r:id="rId15"/>
+    <p:sldId id="269" r:id="rId16"/>
+    <p:sldId id="285" r:id="rId17"/>
   </p:sldIdLst>
   <p:sldSz cx="9144000" cy="6858000" type="screen4x3"/>
   <p:notesSz cx="6858000" cy="9144000"/>
@@ -235,7 +236,7 @@
                 <a:latin typeface="Arial" pitchFamily="34" charset="0"/>
               </a:rPr>
               <a:pPr/>
-              <a:t>11/14/2012</a:t>
+              <a:t>12/19/2012</a:t>
             </a:fld>
             <a:endParaRPr lang="en-US" dirty="0">
               <a:latin typeface="Arial" pitchFamily="34" charset="0"/>
@@ -418,7 +419,7 @@
             <a:fld id="{FC1312E8-DAE4-4DB4-9959-6EFE043C5908}" type="datetimeFigureOut">
               <a:rPr lang="en-US" smtClean="0"/>
               <a:pPr/>
-              <a:t>11/14/2012</a:t>
+              <a:t>12/19/2012</a:t>
             </a:fld>
             <a:endParaRPr lang="en-US" dirty="0"/>
           </a:p>
@@ -893,7 +894,7 @@
             <a:fld id="{373724D0-DD0F-42EF-84DE-838DB5D26951}" type="datetime1">
               <a:rPr lang="en-US" smtClean="0"/>
               <a:pPr/>
-              <a:t>11/14/2012</a:t>
+              <a:t>12/19/2012</a:t>
             </a:fld>
             <a:endParaRPr lang="en-US" dirty="0"/>
           </a:p>
@@ -1137,7 +1138,7 @@
             <a:fld id="{7E42FB2E-ABA8-41CA-9C7C-28F5EB525474}" type="datetime1">
               <a:rPr lang="en-US" smtClean="0"/>
               <a:pPr/>
-              <a:t>11/14/2012</a:t>
+              <a:t>12/19/2012</a:t>
             </a:fld>
             <a:endParaRPr lang="en-US" dirty="0"/>
           </a:p>
@@ -1409,7 +1410,7 @@
             <a:fld id="{7E42FB2E-ABA8-41CA-9C7C-28F5EB525474}" type="datetime1">
               <a:rPr lang="en-US" smtClean="0"/>
               <a:pPr/>
-              <a:t>11/14/2012</a:t>
+              <a:t>12/19/2012</a:t>
             </a:fld>
             <a:endParaRPr lang="en-US" dirty="0"/>
           </a:p>
@@ -1822,7 +1823,7 @@
             <a:fld id="{7E42FB2E-ABA8-41CA-9C7C-28F5EB525474}" type="datetime1">
               <a:rPr lang="en-US" smtClean="0"/>
               <a:pPr/>
-              <a:t>11/14/2012</a:t>
+              <a:t>12/19/2012</a:t>
             </a:fld>
             <a:endParaRPr lang="en-US" dirty="0"/>
           </a:p>
@@ -1901,7 +1902,7 @@
             <a:fld id="{1620389F-DE1D-44C7-B37E-89BCC2F680BE}" type="datetime1">
               <a:rPr lang="en-US" smtClean="0"/>
               <a:pPr/>
-              <a:t>11/14/2012</a:t>
+              <a:t>12/19/2012</a:t>
             </a:fld>
             <a:endParaRPr lang="en-US"/>
           </a:p>
@@ -2012,7 +2013,7 @@
             <a:fld id="{7E42FB2E-ABA8-41CA-9C7C-28F5EB525474}" type="datetime1">
               <a:rPr lang="en-US" smtClean="0"/>
               <a:pPr/>
-              <a:t>11/14/2012</a:t>
+              <a:t>12/19/2012</a:t>
             </a:fld>
             <a:endParaRPr lang="en-US" dirty="0"/>
           </a:p>
@@ -2647,7 +2648,7 @@
             <a:fld id="{7E42FB2E-ABA8-41CA-9C7C-28F5EB525474}" type="datetime1">
               <a:rPr lang="en-US" smtClean="0"/>
               <a:pPr/>
-              <a:t>11/14/2012</a:t>
+              <a:t>12/19/2012</a:t>
             </a:fld>
             <a:endParaRPr lang="en-US" dirty="0"/>
           </a:p>
@@ -3075,7 +3076,11 @@
             <a:pPr lvl="0"/>
             <a:r>
               <a:rPr lang="en-US" dirty="0" smtClean="0"/>
-              <a:t>November 14, 2012</a:t>
+              <a:t>December 14, </a:t>
+            </a:r>
+            <a:r>
+              <a:rPr lang="en-US" dirty="0" smtClean="0"/>
+              <a:t>2012</a:t>
             </a:r>
           </a:p>
         </p:txBody>
@@ -3257,12 +3262,41 @@
           <a:p>
             <a:r>
               <a:rPr lang="en-US" dirty="0" smtClean="0"/>
-              <a:t>Project Schedule</a:t>
+              <a:t>Class Diagram</a:t>
             </a:r>
             <a:endParaRPr lang="en-US" dirty="0"/>
           </a:p>
         </p:txBody>
       </p:sp>
+      <p:pic>
+        <p:nvPicPr>
+          <p:cNvPr id="6" name="Content Placeholder 5"/>
+          <p:cNvPicPr>
+            <a:picLocks noGrp="1" noChangeAspect="1"/>
+          </p:cNvPicPr>
+          <p:nvPr>
+            <p:ph idx="1"/>
+          </p:nvPr>
+        </p:nvPicPr>
+        <p:blipFill>
+          <a:blip r:embed="rId2">
+            <a:extLst>
+              <a:ext uri="{28A0092B-C50C-407E-A947-70E740481C1C}">
+                <a14:useLocalDpi xmlns:a14="http://schemas.microsoft.com/office/drawing/2010/main" val="0"/>
+              </a:ext>
+            </a:extLst>
+          </a:blip>
+          <a:stretch>
+            <a:fillRect/>
+          </a:stretch>
+        </p:blipFill>
+        <p:spPr>
+          <a:xfrm>
+            <a:off x="1031220" y="1152329"/>
+            <a:ext cx="7081559" cy="4823217"/>
+          </a:xfrm>
+        </p:spPr>
+      </p:pic>
       <p:sp>
         <p:nvSpPr>
           <p:cNvPr id="4" name="Date Placeholder 3"/>
@@ -3281,7 +3315,7 @@
             <a:fld id="{373724D0-DD0F-42EF-84DE-838DB5D26951}" type="datetime1">
               <a:rPr lang="en-US" smtClean="0"/>
               <a:pPr/>
-              <a:t>11/14/2012</a:t>
+              <a:t>12/19/2012</a:t>
             </a:fld>
             <a:endParaRPr lang="en-US" dirty="0"/>
           </a:p>
@@ -3306,6 +3340,119 @@
               <a:rPr lang="en-US" smtClean="0"/>
               <a:pPr/>
               <a:t>10</a:t>
+            </a:fld>
+            <a:endParaRPr lang="en-US"/>
+          </a:p>
+        </p:txBody>
+      </p:sp>
+    </p:spTree>
+    <p:extLst>
+      <p:ext uri="{BB962C8B-B14F-4D97-AF65-F5344CB8AC3E}">
+        <p14:creationId xmlns:p14="http://schemas.microsoft.com/office/powerpoint/2010/main" val="4159158884"/>
+      </p:ext>
+    </p:extLst>
+  </p:cSld>
+  <p:clrMapOvr>
+    <a:masterClrMapping/>
+  </p:clrMapOvr>
+  <p:transition>
+    <p:fade/>
+  </p:transition>
+  <p:timing>
+    <p:tnLst>
+      <p:par>
+        <p:cTn id="1" dur="indefinite" restart="never" nodeType="tmRoot"/>
+      </p:par>
+    </p:tnLst>
+  </p:timing>
+</p:sld>
+</file>
+
+<file path=ppt/slides/slide11.xml><?xml version="1.0" encoding="utf-8"?>
+<p:sld xmlns:a="http://schemas.openxmlformats.org/drawingml/2006/main" xmlns:r="http://schemas.openxmlformats.org/officeDocument/2006/relationships" xmlns:p="http://schemas.openxmlformats.org/presentationml/2006/main" show="0">
+  <p:cSld>
+    <p:spTree>
+      <p:nvGrpSpPr>
+        <p:cNvPr id="1" name=""/>
+        <p:cNvGrpSpPr/>
+        <p:nvPr/>
+      </p:nvGrpSpPr>
+      <p:grpSpPr>
+        <a:xfrm>
+          <a:off x="0" y="0"/>
+          <a:ext cx="0" cy="0"/>
+          <a:chOff x="0" y="0"/>
+          <a:chExt cx="0" cy="0"/>
+        </a:xfrm>
+      </p:grpSpPr>
+      <p:sp>
+        <p:nvSpPr>
+          <p:cNvPr id="2" name="Title 1"/>
+          <p:cNvSpPr>
+            <a:spLocks noGrp="1"/>
+          </p:cNvSpPr>
+          <p:nvPr>
+            <p:ph type="title"/>
+          </p:nvPr>
+        </p:nvSpPr>
+        <p:spPr/>
+        <p:txBody>
+          <a:bodyPr>
+            <a:normAutofit fontScale="90000"/>
+          </a:bodyPr>
+          <a:lstStyle/>
+          <a:p>
+            <a:r>
+              <a:rPr lang="en-US" dirty="0" smtClean="0"/>
+              <a:t>Project Schedule</a:t>
+            </a:r>
+            <a:endParaRPr lang="en-US" dirty="0"/>
+          </a:p>
+        </p:txBody>
+      </p:sp>
+      <p:sp>
+        <p:nvSpPr>
+          <p:cNvPr id="4" name="Date Placeholder 3"/>
+          <p:cNvSpPr>
+            <a:spLocks noGrp="1"/>
+          </p:cNvSpPr>
+          <p:nvPr>
+            <p:ph type="dt" sz="half" idx="10"/>
+          </p:nvPr>
+        </p:nvSpPr>
+        <p:spPr/>
+        <p:txBody>
+          <a:bodyPr/>
+          <a:lstStyle/>
+          <a:p>
+            <a:fld id="{373724D0-DD0F-42EF-84DE-838DB5D26951}" type="datetime1">
+              <a:rPr lang="en-US" smtClean="0"/>
+              <a:pPr/>
+              <a:t>12/19/2012</a:t>
+            </a:fld>
+            <a:endParaRPr lang="en-US" dirty="0"/>
+          </a:p>
+        </p:txBody>
+      </p:sp>
+      <p:sp>
+        <p:nvSpPr>
+          <p:cNvPr id="5" name="Slide Number Placeholder 4"/>
+          <p:cNvSpPr>
+            <a:spLocks noGrp="1"/>
+          </p:cNvSpPr>
+          <p:nvPr>
+            <p:ph type="sldNum" sz="quarter" idx="12"/>
+          </p:nvPr>
+        </p:nvSpPr>
+        <p:spPr/>
+        <p:txBody>
+          <a:bodyPr/>
+          <a:lstStyle/>
+          <a:p>
+            <a:fld id="{8D57DBB9-07C6-49AB-BFD5-E737C7E241F6}" type="slidenum">
+              <a:rPr lang="en-US" smtClean="0"/>
+              <a:pPr/>
+              <a:t>11</a:t>
             </a:fld>
             <a:endParaRPr lang="en-US"/>
           </a:p>
@@ -3526,148 +3673,6 @@
 </p:sld>
 </file>
 
-<file path=ppt/slides/slide11.xml><?xml version="1.0" encoding="utf-8"?>
-<p:sld xmlns:a="http://schemas.openxmlformats.org/drawingml/2006/main" xmlns:r="http://schemas.openxmlformats.org/officeDocument/2006/relationships" xmlns:p="http://schemas.openxmlformats.org/presentationml/2006/main">
-  <p:cSld>
-    <p:spTree>
-      <p:nvGrpSpPr>
-        <p:cNvPr id="1" name=""/>
-        <p:cNvGrpSpPr/>
-        <p:nvPr/>
-      </p:nvGrpSpPr>
-      <p:grpSpPr>
-        <a:xfrm>
-          <a:off x="0" y="0"/>
-          <a:ext cx="0" cy="0"/>
-          <a:chOff x="0" y="0"/>
-          <a:chExt cx="0" cy="0"/>
-        </a:xfrm>
-      </p:grpSpPr>
-      <p:sp>
-        <p:nvSpPr>
-          <p:cNvPr id="2" name="Title 1"/>
-          <p:cNvSpPr>
-            <a:spLocks noGrp="1"/>
-          </p:cNvSpPr>
-          <p:nvPr>
-            <p:ph type="title"/>
-          </p:nvPr>
-        </p:nvSpPr>
-        <p:spPr>
-          <a:xfrm>
-            <a:off x="715113" y="3456500"/>
-            <a:ext cx="7772400" cy="1362075"/>
-          </a:xfrm>
-        </p:spPr>
-        <p:txBody>
-          <a:bodyPr/>
-          <a:lstStyle/>
-          <a:p>
-            <a:r>
-              <a:rPr lang="en-US" dirty="0"/>
-              <a:t>Backup Slides</a:t>
-            </a:r>
-          </a:p>
-        </p:txBody>
-      </p:sp>
-      <p:sp>
-        <p:nvSpPr>
-          <p:cNvPr id="3" name="Text Placeholder 2"/>
-          <p:cNvSpPr>
-            <a:spLocks noGrp="1"/>
-          </p:cNvSpPr>
-          <p:nvPr>
-            <p:ph type="body" idx="1"/>
-          </p:nvPr>
-        </p:nvSpPr>
-        <p:spPr>
-          <a:xfrm>
-            <a:off x="715113" y="3871513"/>
-            <a:ext cx="7772400" cy="1500187"/>
-          </a:xfrm>
-        </p:spPr>
-        <p:txBody>
-          <a:bodyPr/>
-          <a:lstStyle/>
-          <a:p>
-            <a:r>
-              <a:rPr lang="en-US" dirty="0"/>
-              <a:t>Include extra slides if discussion goes ‘deeper’ and all slides from after meeting</a:t>
-            </a:r>
-          </a:p>
-          <a:p>
-            <a:endParaRPr lang="en-US" dirty="0"/>
-          </a:p>
-        </p:txBody>
-      </p:sp>
-      <p:sp>
-        <p:nvSpPr>
-          <p:cNvPr id="4" name="Date Placeholder 3"/>
-          <p:cNvSpPr>
-            <a:spLocks noGrp="1"/>
-          </p:cNvSpPr>
-          <p:nvPr>
-            <p:ph type="dt" sz="half" idx="10"/>
-          </p:nvPr>
-        </p:nvSpPr>
-        <p:spPr/>
-        <p:txBody>
-          <a:bodyPr/>
-          <a:lstStyle/>
-          <a:p>
-            <a:fld id="{7E42FB2E-ABA8-41CA-9C7C-28F5EB525474}" type="datetime1">
-              <a:rPr lang="en-US" smtClean="0"/>
-              <a:pPr/>
-              <a:t>11/14/2012</a:t>
-            </a:fld>
-            <a:endParaRPr lang="en-US" dirty="0"/>
-          </a:p>
-        </p:txBody>
-      </p:sp>
-      <p:sp>
-        <p:nvSpPr>
-          <p:cNvPr id="5" name="Slide Number Placeholder 4"/>
-          <p:cNvSpPr>
-            <a:spLocks noGrp="1"/>
-          </p:cNvSpPr>
-          <p:nvPr>
-            <p:ph type="sldNum" sz="quarter" idx="12"/>
-          </p:nvPr>
-        </p:nvSpPr>
-        <p:spPr/>
-        <p:txBody>
-          <a:bodyPr/>
-          <a:lstStyle/>
-          <a:p>
-            <a:fld id="{8D57DBB9-07C6-49AB-BFD5-E737C7E241F6}" type="slidenum">
-              <a:rPr lang="en-US" smtClean="0"/>
-              <a:pPr/>
-              <a:t>11</a:t>
-            </a:fld>
-            <a:endParaRPr lang="en-US" dirty="0"/>
-          </a:p>
-        </p:txBody>
-      </p:sp>
-    </p:spTree>
-    <p:extLst>
-      <p:ext uri="{BB962C8B-B14F-4D97-AF65-F5344CB8AC3E}">
-        <p14:creationId xmlns:p14="http://schemas.microsoft.com/office/powerpoint/2010/main" val="3827783441"/>
-      </p:ext>
-    </p:extLst>
-  </p:cSld>
-  <p:clrMapOvr>
-    <a:masterClrMapping/>
-  </p:clrMapOvr>
-  <p:timing>
-    <p:tnLst>
-      <p:par>
-        <p:cTn id="1" dur="indefinite" restart="never" nodeType="tmRoot"/>
-      </p:par>
-    </p:tnLst>
-  </p:timing>
-</p:sld>
-</file>
-
 <file path=ppt/slides/slide12.xml><?xml version="1.0" encoding="utf-8"?>
 <p:sld xmlns:a="http://schemas.openxmlformats.org/drawingml/2006/main" xmlns:r="http://schemas.openxmlformats.org/officeDocument/2006/relationships" xmlns:p="http://schemas.openxmlformats.org/presentationml/2006/main">
   <p:cSld>
@@ -3687,7 +3692,7 @@
       </p:grpSpPr>
       <p:sp>
         <p:nvSpPr>
-          <p:cNvPr id="7" name="Title 6"/>
+          <p:cNvPr id="2" name="Title 1"/>
           <p:cNvSpPr>
             <a:spLocks noGrp="1"/>
           </p:cNvSpPr>
@@ -3695,126 +3700,49 @@
             <p:ph type="title"/>
           </p:nvPr>
         </p:nvSpPr>
-        <p:spPr/>
-        <p:txBody>
-          <a:bodyPr>
-            <a:normAutofit fontScale="90000"/>
-          </a:bodyPr>
+        <p:spPr>
+          <a:xfrm>
+            <a:off x="715113" y="3456500"/>
+            <a:ext cx="7772400" cy="1362075"/>
+          </a:xfrm>
+        </p:spPr>
+        <p:txBody>
+          <a:bodyPr/>
           <a:lstStyle/>
           <a:p>
             <a:r>
-              <a:rPr lang="en-US" dirty="0" smtClean="0"/>
-              <a:t>Project Schedule &amp; Milestones</a:t>
-            </a:r>
-            <a:endParaRPr lang="en-US" dirty="0"/>
-          </a:p>
-        </p:txBody>
-      </p:sp>
-      <p:sp>
-        <p:nvSpPr>
-          <p:cNvPr id="8" name="Content Placeholder 7"/>
+              <a:rPr lang="en-US" dirty="0"/>
+              <a:t>Backup Slides</a:t>
+            </a:r>
+          </a:p>
+        </p:txBody>
+      </p:sp>
+      <p:sp>
+        <p:nvSpPr>
+          <p:cNvPr id="3" name="Text Placeholder 2"/>
           <p:cNvSpPr>
             <a:spLocks noGrp="1"/>
           </p:cNvSpPr>
           <p:nvPr>
-            <p:ph idx="1"/>
-          </p:nvPr>
-        </p:nvSpPr>
-        <p:spPr/>
+            <p:ph type="body" idx="1"/>
+          </p:nvPr>
+        </p:nvSpPr>
+        <p:spPr>
+          <a:xfrm>
+            <a:off x="715113" y="3871513"/>
+            <a:ext cx="7772400" cy="1500187"/>
+          </a:xfrm>
+        </p:spPr>
         <p:txBody>
           <a:bodyPr/>
           <a:lstStyle/>
           <a:p>
             <a:r>
-              <a:rPr lang="en-US" dirty="0" smtClean="0"/>
-              <a:t>System Requirements Review:  September 26</a:t>
-            </a:r>
-            <a:r>
-              <a:rPr lang="en-US" baseline="30000" dirty="0" smtClean="0"/>
-              <a:t>th</a:t>
-            </a:r>
-          </a:p>
-          <a:p>
-            <a:r>
-              <a:rPr lang="en-US" dirty="0" smtClean="0"/>
-              <a:t>Preliminary Design Review:        November 14</a:t>
-            </a:r>
-            <a:r>
-              <a:rPr lang="en-US" baseline="30000" dirty="0" smtClean="0"/>
-              <a:t>th</a:t>
-            </a:r>
-            <a:endParaRPr lang="en-US" dirty="0" smtClean="0"/>
-          </a:p>
-          <a:p>
-            <a:r>
-              <a:rPr lang="en-US" dirty="0" smtClean="0"/>
-              <a:t>Alpha Release:                              December 19</a:t>
-            </a:r>
-            <a:r>
-              <a:rPr lang="en-US" baseline="30000" dirty="0" smtClean="0"/>
-              <a:t>th</a:t>
-            </a:r>
-          </a:p>
-          <a:p>
-            <a:r>
-              <a:rPr lang="en-US" dirty="0" smtClean="0"/>
-              <a:t>Beta Release:                                     February 6</a:t>
-            </a:r>
-            <a:r>
-              <a:rPr lang="en-US" baseline="30000" dirty="0" smtClean="0"/>
-              <a:t>th</a:t>
-            </a:r>
-            <a:r>
-              <a:rPr lang="en-US" dirty="0" smtClean="0"/>
-              <a:t> </a:t>
-            </a:r>
-          </a:p>
-          <a:p>
-            <a:r>
-              <a:rPr lang="en-US" dirty="0" smtClean="0"/>
-              <a:t>Critical Design Review:                     February 6</a:t>
-            </a:r>
-            <a:r>
-              <a:rPr lang="en-US" baseline="30000" dirty="0" smtClean="0"/>
-              <a:t>th</a:t>
-            </a:r>
-            <a:endParaRPr lang="en-US" dirty="0" smtClean="0"/>
-          </a:p>
-          <a:p>
-            <a:r>
-              <a:rPr lang="en-US" dirty="0" smtClean="0"/>
-              <a:t>Test Readiness Review:                       March 20</a:t>
-            </a:r>
-            <a:r>
-              <a:rPr lang="en-US" baseline="30000" dirty="0" smtClean="0"/>
-              <a:t>th</a:t>
-            </a:r>
-            <a:endParaRPr lang="en-US" dirty="0" smtClean="0"/>
-          </a:p>
-          <a:p>
-            <a:r>
-              <a:rPr lang="en-US" dirty="0" smtClean="0"/>
-              <a:t>Final Release:                                          April 17</a:t>
-            </a:r>
-            <a:r>
-              <a:rPr lang="en-US" baseline="30000" dirty="0" smtClean="0"/>
-              <a:t>th</a:t>
-            </a:r>
-            <a:endParaRPr lang="en-US" dirty="0" smtClean="0"/>
-          </a:p>
-          <a:p>
-            <a:r>
-              <a:rPr lang="en-US" dirty="0" smtClean="0"/>
-              <a:t>Expo/Out brief:                                       May 22</a:t>
-            </a:r>
-            <a:r>
-              <a:rPr lang="en-US" baseline="30000" dirty="0" smtClean="0"/>
-              <a:t>nd</a:t>
-            </a:r>
-            <a:r>
-              <a:rPr lang="en-US" dirty="0" smtClean="0"/>
-              <a:t> </a:t>
-            </a:r>
+              <a:rPr lang="en-US" dirty="0"/>
+              <a:t>Include extra slides if discussion goes ‘deeper’ and all slides from after meeting</a:t>
+            </a:r>
+          </a:p>
+          <a:p>
             <a:endParaRPr lang="en-US" dirty="0"/>
           </a:p>
         </p:txBody>
@@ -3837,7 +3765,7 @@
             <a:fld id="{7E42FB2E-ABA8-41CA-9C7C-28F5EB525474}" type="datetime1">
               <a:rPr lang="en-US" smtClean="0"/>
               <a:pPr/>
-              <a:t>11/14/2012</a:t>
+              <a:t>12/19/2012</a:t>
             </a:fld>
             <a:endParaRPr lang="en-US" dirty="0"/>
           </a:p>
@@ -3870,16 +3798,13 @@
     </p:spTree>
     <p:extLst>
       <p:ext uri="{BB962C8B-B14F-4D97-AF65-F5344CB8AC3E}">
-        <p14:creationId xmlns:p14="http://schemas.microsoft.com/office/powerpoint/2010/main" val="3661795386"/>
+        <p14:creationId xmlns:p14="http://schemas.microsoft.com/office/powerpoint/2010/main" val="3827783441"/>
       </p:ext>
     </p:extLst>
   </p:cSld>
   <p:clrMapOvr>
     <a:masterClrMapping/>
   </p:clrMapOvr>
-  <p:transition>
-    <p:fade/>
-  </p:transition>
   <p:timing>
     <p:tnLst>
       <p:par>
@@ -3909,6 +3834,228 @@
       </p:grpSpPr>
       <p:sp>
         <p:nvSpPr>
+          <p:cNvPr id="7" name="Title 6"/>
+          <p:cNvSpPr>
+            <a:spLocks noGrp="1"/>
+          </p:cNvSpPr>
+          <p:nvPr>
+            <p:ph type="title"/>
+          </p:nvPr>
+        </p:nvSpPr>
+        <p:spPr/>
+        <p:txBody>
+          <a:bodyPr>
+            <a:normAutofit fontScale="90000"/>
+          </a:bodyPr>
+          <a:lstStyle/>
+          <a:p>
+            <a:r>
+              <a:rPr lang="en-US" dirty="0" smtClean="0"/>
+              <a:t>Project Schedule &amp; Milestones</a:t>
+            </a:r>
+            <a:endParaRPr lang="en-US" dirty="0"/>
+          </a:p>
+        </p:txBody>
+      </p:sp>
+      <p:sp>
+        <p:nvSpPr>
+          <p:cNvPr id="8" name="Content Placeholder 7"/>
+          <p:cNvSpPr>
+            <a:spLocks noGrp="1"/>
+          </p:cNvSpPr>
+          <p:nvPr>
+            <p:ph idx="1"/>
+          </p:nvPr>
+        </p:nvSpPr>
+        <p:spPr/>
+        <p:txBody>
+          <a:bodyPr/>
+          <a:lstStyle/>
+          <a:p>
+            <a:r>
+              <a:rPr lang="en-US" dirty="0" smtClean="0"/>
+              <a:t>System Requirements Review:  September 26</a:t>
+            </a:r>
+            <a:r>
+              <a:rPr lang="en-US" baseline="30000" dirty="0" smtClean="0"/>
+              <a:t>th</a:t>
+            </a:r>
+          </a:p>
+          <a:p>
+            <a:r>
+              <a:rPr lang="en-US" dirty="0" smtClean="0"/>
+              <a:t>Preliminary Design Review:        November 14</a:t>
+            </a:r>
+            <a:r>
+              <a:rPr lang="en-US" baseline="30000" dirty="0" smtClean="0"/>
+              <a:t>th</a:t>
+            </a:r>
+            <a:endParaRPr lang="en-US" dirty="0" smtClean="0"/>
+          </a:p>
+          <a:p>
+            <a:r>
+              <a:rPr lang="en-US" dirty="0" smtClean="0"/>
+              <a:t>Alpha Release:                              December 19</a:t>
+            </a:r>
+            <a:r>
+              <a:rPr lang="en-US" baseline="30000" dirty="0" smtClean="0"/>
+              <a:t>th</a:t>
+            </a:r>
+          </a:p>
+          <a:p>
+            <a:r>
+              <a:rPr lang="en-US" dirty="0" smtClean="0"/>
+              <a:t>Beta Release:                                     February 6</a:t>
+            </a:r>
+            <a:r>
+              <a:rPr lang="en-US" baseline="30000" dirty="0" smtClean="0"/>
+              <a:t>th</a:t>
+            </a:r>
+            <a:r>
+              <a:rPr lang="en-US" dirty="0" smtClean="0"/>
+              <a:t> </a:t>
+            </a:r>
+          </a:p>
+          <a:p>
+            <a:r>
+              <a:rPr lang="en-US" dirty="0" smtClean="0"/>
+              <a:t>Critical Design Review:                     February 6</a:t>
+            </a:r>
+            <a:r>
+              <a:rPr lang="en-US" baseline="30000" dirty="0" smtClean="0"/>
+              <a:t>th</a:t>
+            </a:r>
+            <a:endParaRPr lang="en-US" dirty="0" smtClean="0"/>
+          </a:p>
+          <a:p>
+            <a:r>
+              <a:rPr lang="en-US" dirty="0" smtClean="0"/>
+              <a:t>Test Readiness Review:                       March 20</a:t>
+            </a:r>
+            <a:r>
+              <a:rPr lang="en-US" baseline="30000" dirty="0" smtClean="0"/>
+              <a:t>th</a:t>
+            </a:r>
+            <a:endParaRPr lang="en-US" dirty="0" smtClean="0"/>
+          </a:p>
+          <a:p>
+            <a:r>
+              <a:rPr lang="en-US" dirty="0" smtClean="0"/>
+              <a:t>Final Release:                                          April 17</a:t>
+            </a:r>
+            <a:r>
+              <a:rPr lang="en-US" baseline="30000" dirty="0" smtClean="0"/>
+              <a:t>th</a:t>
+            </a:r>
+            <a:endParaRPr lang="en-US" dirty="0" smtClean="0"/>
+          </a:p>
+          <a:p>
+            <a:r>
+              <a:rPr lang="en-US" dirty="0" smtClean="0"/>
+              <a:t>Expo/Out brief:                                       May 22</a:t>
+            </a:r>
+            <a:r>
+              <a:rPr lang="en-US" baseline="30000" dirty="0" smtClean="0"/>
+              <a:t>nd</a:t>
+            </a:r>
+            <a:r>
+              <a:rPr lang="en-US" dirty="0" smtClean="0"/>
+              <a:t> </a:t>
+            </a:r>
+            <a:endParaRPr lang="en-US" dirty="0"/>
+          </a:p>
+        </p:txBody>
+      </p:sp>
+      <p:sp>
+        <p:nvSpPr>
+          <p:cNvPr id="4" name="Date Placeholder 3"/>
+          <p:cNvSpPr>
+            <a:spLocks noGrp="1"/>
+          </p:cNvSpPr>
+          <p:nvPr>
+            <p:ph type="dt" sz="half" idx="10"/>
+          </p:nvPr>
+        </p:nvSpPr>
+        <p:spPr/>
+        <p:txBody>
+          <a:bodyPr/>
+          <a:lstStyle/>
+          <a:p>
+            <a:fld id="{7E42FB2E-ABA8-41CA-9C7C-28F5EB525474}" type="datetime1">
+              <a:rPr lang="en-US" smtClean="0"/>
+              <a:pPr/>
+              <a:t>12/19/2012</a:t>
+            </a:fld>
+            <a:endParaRPr lang="en-US" dirty="0"/>
+          </a:p>
+        </p:txBody>
+      </p:sp>
+      <p:sp>
+        <p:nvSpPr>
+          <p:cNvPr id="5" name="Slide Number Placeholder 4"/>
+          <p:cNvSpPr>
+            <a:spLocks noGrp="1"/>
+          </p:cNvSpPr>
+          <p:nvPr>
+            <p:ph type="sldNum" sz="quarter" idx="12"/>
+          </p:nvPr>
+        </p:nvSpPr>
+        <p:spPr/>
+        <p:txBody>
+          <a:bodyPr/>
+          <a:lstStyle/>
+          <a:p>
+            <a:fld id="{8D57DBB9-07C6-49AB-BFD5-E737C7E241F6}" type="slidenum">
+              <a:rPr lang="en-US" smtClean="0"/>
+              <a:pPr/>
+              <a:t>13</a:t>
+            </a:fld>
+            <a:endParaRPr lang="en-US" dirty="0"/>
+          </a:p>
+        </p:txBody>
+      </p:sp>
+    </p:spTree>
+    <p:extLst>
+      <p:ext uri="{BB962C8B-B14F-4D97-AF65-F5344CB8AC3E}">
+        <p14:creationId xmlns:p14="http://schemas.microsoft.com/office/powerpoint/2010/main" val="3661795386"/>
+      </p:ext>
+    </p:extLst>
+  </p:cSld>
+  <p:clrMapOvr>
+    <a:masterClrMapping/>
+  </p:clrMapOvr>
+  <p:transition>
+    <p:fade/>
+  </p:transition>
+  <p:timing>
+    <p:tnLst>
+      <p:par>
+        <p:cTn id="1" dur="indefinite" restart="never" nodeType="tmRoot"/>
+      </p:par>
+    </p:tnLst>
+  </p:timing>
+</p:sld>
+</file>
+
+<file path=ppt/slides/slide14.xml><?xml version="1.0" encoding="utf-8"?>
+<p:sld xmlns:a="http://schemas.openxmlformats.org/drawingml/2006/main" xmlns:r="http://schemas.openxmlformats.org/officeDocument/2006/relationships" xmlns:p="http://schemas.openxmlformats.org/presentationml/2006/main">
+  <p:cSld>
+    <p:spTree>
+      <p:nvGrpSpPr>
+        <p:cNvPr id="1" name=""/>
+        <p:cNvGrpSpPr/>
+        <p:nvPr/>
+      </p:nvGrpSpPr>
+      <p:grpSpPr>
+        <a:xfrm>
+          <a:off x="0" y="0"/>
+          <a:ext cx="0" cy="0"/>
+          <a:chOff x="0" y="0"/>
+          <a:chExt cx="0" cy="0"/>
+        </a:xfrm>
+      </p:grpSpPr>
+      <p:sp>
+        <p:nvSpPr>
           <p:cNvPr id="6" name="Title 5"/>
           <p:cNvSpPr>
             <a:spLocks noGrp="1"/>
@@ -3955,7 +4102,7 @@
             <a:fld id="{7E42FB2E-ABA8-41CA-9C7C-28F5EB525474}" type="datetime1">
               <a:rPr lang="en-US" smtClean="0"/>
               <a:pPr/>
-              <a:t>11/14/2012</a:t>
+              <a:t>12/19/2012</a:t>
             </a:fld>
             <a:endParaRPr lang="en-US" dirty="0"/>
           </a:p>
@@ -3979,7 +4126,7 @@
             <a:fld id="{8D57DBB9-07C6-49AB-BFD5-E737C7E241F6}" type="slidenum">
               <a:rPr lang="en-US" smtClean="0"/>
               <a:pPr/>
-              <a:t>13</a:t>
+              <a:t>14</a:t>
             </a:fld>
             <a:endParaRPr lang="en-US" dirty="0"/>
           </a:p>
@@ -5217,7 +5364,7 @@
 </p:sld>
 </file>
 
-<file path=ppt/slides/slide14.xml><?xml version="1.0" encoding="utf-8"?>
+<file path=ppt/slides/slide15.xml><?xml version="1.0" encoding="utf-8"?>
 <p:sld xmlns:a="http://schemas.openxmlformats.org/drawingml/2006/main" xmlns:r="http://schemas.openxmlformats.org/officeDocument/2006/relationships" xmlns:p="http://schemas.openxmlformats.org/presentationml/2006/main">
   <p:cSld>
     <p:spTree>
@@ -5302,7 +5449,6 @@
               <a:rPr lang="en-US" sz="2400" dirty="0" smtClean="0"/>
               <a:t>manner</a:t>
             </a:r>
-            <a:endParaRPr lang="en-US" sz="2400" dirty="0" smtClean="0"/>
           </a:p>
           <a:p>
             <a:r>
@@ -5324,7 +5470,6 @@
               <a:rPr lang="en-US" sz="2400" dirty="0" smtClean="0"/>
               <a:t>Android device can cache enough map data to allow for smooth map transitions</a:t>
             </a:r>
-            <a:endParaRPr lang="en-US" sz="2400" dirty="0" smtClean="0"/>
           </a:p>
           <a:p>
             <a:r>
@@ -5359,7 +5504,7 @@
             <a:fld id="{1620389F-DE1D-44C7-B37E-89BCC2F680BE}" type="datetime1">
               <a:rPr lang="en-US" smtClean="0"/>
               <a:pPr/>
-              <a:t>11/14/2012</a:t>
+              <a:t>12/19/2012</a:t>
             </a:fld>
             <a:endParaRPr lang="en-US"/>
           </a:p>
@@ -5383,7 +5528,7 @@
             <a:fld id="{8D57DBB9-07C6-49AB-BFD5-E737C7E241F6}" type="slidenum">
               <a:rPr lang="en-US" smtClean="0"/>
               <a:pPr/>
-              <a:t>14</a:t>
+              <a:t>15</a:t>
             </a:fld>
             <a:endParaRPr lang="en-US"/>
           </a:p>
@@ -5412,7 +5557,7 @@
 </p:sld>
 </file>
 
-<file path=ppt/slides/slide15.xml><?xml version="1.0" encoding="utf-8"?>
+<file path=ppt/slides/slide16.xml><?xml version="1.0" encoding="utf-8"?>
 <p:sld xmlns:a="http://schemas.openxmlformats.org/drawingml/2006/main" xmlns:r="http://schemas.openxmlformats.org/officeDocument/2006/relationships" xmlns:p="http://schemas.openxmlformats.org/presentationml/2006/main">
   <p:cSld>
     <p:spTree>
@@ -5501,7 +5646,7 @@
             <a:fld id="{373724D0-DD0F-42EF-84DE-838DB5D26951}" type="datetime1">
               <a:rPr lang="en-US" smtClean="0"/>
               <a:pPr/>
-              <a:t>11/14/2012</a:t>
+              <a:t>12/19/2012</a:t>
             </a:fld>
             <a:endParaRPr lang="en-US" dirty="0"/>
           </a:p>
@@ -5525,7 +5670,7 @@
             <a:fld id="{8D57DBB9-07C6-49AB-BFD5-E737C7E241F6}" type="slidenum">
               <a:rPr lang="en-US" smtClean="0"/>
               <a:pPr/>
-              <a:t>15</a:t>
+              <a:t>16</a:t>
             </a:fld>
             <a:endParaRPr lang="en-US"/>
           </a:p>
@@ -5831,15 +5976,7 @@
             </a:pPr>
             <a:r>
               <a:rPr lang="en-US" sz="1600" dirty="0" smtClean="0"/>
-              <a:t>	Critical </a:t>
-            </a:r>
-            <a:r>
-              <a:rPr lang="en-US" sz="1600" dirty="0" smtClean="0"/>
-              <a:t>Design </a:t>
-            </a:r>
-            <a:r>
-              <a:rPr lang="en-US" sz="1600" dirty="0" smtClean="0"/>
-              <a:t>Review (CDR) – 13 Feb 2013</a:t>
+              <a:t>	Critical Design Review (CDR) – 13 Feb 2013</a:t>
             </a:r>
           </a:p>
         </p:txBody>
@@ -5862,7 +5999,7 @@
             <a:fld id="{373724D0-DD0F-42EF-84DE-838DB5D26951}" type="datetime1">
               <a:rPr lang="en-US" smtClean="0"/>
               <a:pPr/>
-              <a:t>11/14/2012</a:t>
+              <a:t>12/19/2012</a:t>
             </a:fld>
             <a:endParaRPr lang="en-US" dirty="0"/>
           </a:p>
@@ -5946,7 +6083,7 @@
 </file>
 
 <file path=ppt/slides/slide3.xml><?xml version="1.0" encoding="utf-8"?>
-<p:sld xmlns:a="http://schemas.openxmlformats.org/drawingml/2006/main" xmlns:r="http://schemas.openxmlformats.org/officeDocument/2006/relationships" xmlns:p="http://schemas.openxmlformats.org/presentationml/2006/main">
+<p:sld xmlns:a="http://schemas.openxmlformats.org/drawingml/2006/main" xmlns:r="http://schemas.openxmlformats.org/officeDocument/2006/relationships" xmlns:p="http://schemas.openxmlformats.org/presentationml/2006/main" show="0">
   <p:cSld>
     <p:spTree>
       <p:nvGrpSpPr>
@@ -6005,7 +6142,7 @@
             <a:fld id="{373724D0-DD0F-42EF-84DE-838DB5D26951}" type="datetime1">
               <a:rPr lang="en-US" smtClean="0"/>
               <a:pPr/>
-              <a:t>11/14/2012</a:t>
+              <a:t>12/19/2012</a:t>
             </a:fld>
             <a:endParaRPr lang="en-US" dirty="0"/>
           </a:p>
@@ -7194,7 +7331,7 @@
 </file>
 
 <file path=ppt/slides/slide4.xml><?xml version="1.0" encoding="utf-8"?>
-<p:sld xmlns:a="http://schemas.openxmlformats.org/drawingml/2006/main" xmlns:r="http://schemas.openxmlformats.org/officeDocument/2006/relationships" xmlns:p="http://schemas.openxmlformats.org/presentationml/2006/main">
+<p:sld xmlns:a="http://schemas.openxmlformats.org/drawingml/2006/main" xmlns:r="http://schemas.openxmlformats.org/officeDocument/2006/relationships" xmlns:p="http://schemas.openxmlformats.org/presentationml/2006/main" show="0">
   <p:cSld>
     <p:spTree>
       <p:nvGrpSpPr>
@@ -8013,7 +8150,7 @@
             <a:fld id="{373724D0-DD0F-42EF-84DE-838DB5D26951}" type="datetime1">
               <a:rPr lang="en-US" smtClean="0"/>
               <a:pPr/>
-              <a:t>11/14/2012</a:t>
+              <a:t>12/19/2012</a:t>
             </a:fld>
             <a:endParaRPr lang="en-US" dirty="0"/>
           </a:p>
@@ -8127,11 +8264,7 @@
           <a:p>
             <a:r>
               <a:rPr lang="en-US" dirty="0" smtClean="0"/>
-              <a:t>High Level </a:t>
-            </a:r>
-            <a:r>
-              <a:rPr lang="en-US" dirty="0" smtClean="0"/>
-              <a:t>Overview</a:t>
+              <a:t>High Level Overview</a:t>
             </a:r>
           </a:p>
           <a:p>
@@ -8144,11 +8277,7 @@
           <a:p>
             <a:r>
               <a:rPr lang="en-US" dirty="0" smtClean="0"/>
-              <a:t>Package </a:t>
-            </a:r>
-            <a:r>
-              <a:rPr lang="en-US" dirty="0" smtClean="0"/>
-              <a:t>Diagram</a:t>
+              <a:t>Package Diagram</a:t>
             </a:r>
           </a:p>
           <a:p>
@@ -8161,11 +8290,7 @@
           <a:p>
             <a:r>
               <a:rPr lang="en-US" dirty="0" smtClean="0"/>
-              <a:t>System Sequence </a:t>
-            </a:r>
-            <a:r>
-              <a:rPr lang="en-US" dirty="0" smtClean="0"/>
-              <a:t>Diagrams</a:t>
+              <a:t>System Sequence Diagrams</a:t>
             </a:r>
           </a:p>
           <a:p>
@@ -8190,39 +8315,24 @@
               <a:rPr lang="en-US" dirty="0" smtClean="0"/>
               <a:t>nterest (POI) data.</a:t>
             </a:r>
-            <a:endParaRPr lang="en-US" dirty="0" smtClean="0"/>
           </a:p>
           <a:p>
             <a:r>
               <a:rPr lang="en-US" dirty="0" smtClean="0"/>
-              <a:t>UML </a:t>
-            </a:r>
-            <a:r>
-              <a:rPr lang="en-US" dirty="0" smtClean="0"/>
-              <a:t>Class </a:t>
-            </a:r>
-            <a:r>
-              <a:rPr lang="en-US" dirty="0" smtClean="0"/>
-              <a:t>Diagram</a:t>
+              <a:t>UML Class Diagram</a:t>
             </a:r>
           </a:p>
           <a:p>
             <a:pPr lvl="1"/>
             <a:r>
               <a:rPr lang="en-US" sz="2000" dirty="0"/>
-              <a:t>Shows all the components of the system and their interactions and dependencies</a:t>
-            </a:r>
-          </a:p>
-          <a:p>
-            <a:pPr lvl="1"/>
-            <a:r>
-              <a:rPr lang="en-US" sz="2000" dirty="0"/>
-              <a:t>Part of Final </a:t>
-            </a:r>
-            <a:r>
-              <a:rPr lang="en-US" sz="2000" dirty="0"/>
-              <a:t>Design</a:t>
-            </a:r>
+              <a:t>Shows all the components of the system and their interactions and </a:t>
+            </a:r>
+            <a:r>
+              <a:rPr lang="en-US" sz="2000" dirty="0" smtClean="0"/>
+              <a:t>dependencies</a:t>
+            </a:r>
+            <a:endParaRPr lang="en-US" sz="2000" dirty="0"/>
           </a:p>
         </p:txBody>
       </p:sp>
@@ -8244,7 +8354,7 @@
             <a:fld id="{373724D0-DD0F-42EF-84DE-838DB5D26951}" type="datetime1">
               <a:rPr lang="en-US" smtClean="0"/>
               <a:pPr/>
-              <a:t>11/14/2012</a:t>
+              <a:t>12/19/2012</a:t>
             </a:fld>
             <a:endParaRPr lang="en-US" dirty="0"/>
           </a:p>
@@ -8287,6 +8397,13 @@
   <p:transition>
     <p:fade/>
   </p:transition>
+  <p:timing>
+    <p:tnLst>
+      <p:par>
+        <p:cTn id="1" dur="indefinite" restart="never" nodeType="tmRoot"/>
+      </p:par>
+    </p:tnLst>
+  </p:timing>
 </p:sld>
 </file>
 
@@ -8350,7 +8467,7 @@
             <a:fld id="{373724D0-DD0F-42EF-84DE-838DB5D26951}" type="datetime1">
               <a:rPr lang="en-US" smtClean="0"/>
               <a:pPr/>
-              <a:t>11/14/2012</a:t>
+              <a:t>12/19/2012</a:t>
             </a:fld>
             <a:endParaRPr lang="en-US" dirty="0"/>
           </a:p>
@@ -8521,7 +8638,7 @@
             <a:fld id="{373724D0-DD0F-42EF-84DE-838DB5D26951}" type="datetime1">
               <a:rPr lang="en-US" smtClean="0"/>
               <a:pPr/>
-              <a:t>11/14/2012</a:t>
+              <a:t>12/19/2012</a:t>
             </a:fld>
             <a:endParaRPr lang="en-US" dirty="0"/>
           </a:p>
@@ -8564,6 +8681,13 @@
   <p:transition>
     <p:fade/>
   </p:transition>
+  <p:timing>
+    <p:tnLst>
+      <p:par>
+        <p:cTn id="1" dur="indefinite" restart="never" nodeType="tmRoot"/>
+      </p:par>
+    </p:tnLst>
+  </p:timing>
 </p:sld>
 </file>
 
@@ -8656,7 +8780,7 @@
             <a:fld id="{373724D0-DD0F-42EF-84DE-838DB5D26951}" type="datetime1">
               <a:rPr lang="en-US" smtClean="0"/>
               <a:pPr/>
-              <a:t>11/14/2012</a:t>
+              <a:t>12/19/2012</a:t>
             </a:fld>
             <a:endParaRPr lang="en-US" dirty="0"/>
           </a:p>
@@ -8699,6 +8823,13 @@
   <p:transition>
     <p:fade/>
   </p:transition>
+  <p:timing>
+    <p:tnLst>
+      <p:par>
+        <p:cTn id="1" dur="indefinite" restart="never" nodeType="tmRoot"/>
+      </p:par>
+    </p:tnLst>
+  </p:timing>
 </p:sld>
 </file>
 
@@ -8790,7 +8921,7 @@
             <a:fld id="{373724D0-DD0F-42EF-84DE-838DB5D26951}" type="datetime1">
               <a:rPr lang="en-US" smtClean="0"/>
               <a:pPr/>
-              <a:t>11/14/2012</a:t>
+              <a:t>12/19/2012</a:t>
             </a:fld>
             <a:endParaRPr lang="en-US" dirty="0"/>
           </a:p>
@@ -8833,6 +8964,13 @@
   <p:transition>
     <p:fade/>
   </p:transition>
+  <p:timing>
+    <p:tnLst>
+      <p:par>
+        <p:cTn id="1" dur="indefinite" restart="never" nodeType="tmRoot"/>
+      </p:par>
+    </p:tnLst>
+  </p:timing>
 </p:sld>
 </file>
 

</xml_diff>